<commit_message>
Update slides and TTF demos.
</commit_message>
<xml_diff>
--- a/Slides/Specflow/Specflow.pptx
+++ b/Slides/Specflow/Specflow.pptx
@@ -9,7 +9,7 @@
   </p:notesMasterIdLst>
   <p:sldIdLst>
     <p:sldId id="373" r:id="rId2"/>
-    <p:sldId id="366" r:id="rId3"/>
+    <p:sldId id="389" r:id="rId3"/>
     <p:sldId id="258" r:id="rId4"/>
     <p:sldId id="379" r:id="rId5"/>
     <p:sldId id="374" r:id="rId6"/>
@@ -225,7 +225,7 @@
           <a:p>
             <a:fld id="{644303E9-1A8A-406D-9DFA-FF87524EDF5C}" type="datetimeFigureOut">
               <a:rPr lang="en-US" smtClean="0"/>
-              <a:t>9/18/2014</a:t>
+              <a:t>10/5/2014</a:t>
             </a:fld>
             <a:endParaRPr lang="en-US"/>
           </a:p>
@@ -11433,19 +11433,6 @@
               <a:rPr lang="en-US" sz="2400" dirty="0" smtClean="0"/>
               <a:t> Team</a:t>
             </a:r>
-          </a:p>
-          <a:p>
-            <a:pPr lvl="1">
-              <a:lnSpc>
-                <a:spcPct val="100000"/>
-              </a:lnSpc>
-              <a:spcBef>
-                <a:spcPts val="300"/>
-              </a:spcBef>
-              <a:spcAft>
-                <a:spcPts val="300"/>
-              </a:spcAft>
-            </a:pPr>
             <a:endParaRPr lang="en-US" sz="2400" dirty="0"/>
           </a:p>
           <a:p>
@@ -11462,20 +11449,6 @@
               <a:buNone/>
             </a:pPr>
             <a:endParaRPr lang="en-US" sz="2400" dirty="0"/>
-          </a:p>
-          <a:p>
-            <a:pPr lvl="1">
-              <a:lnSpc>
-                <a:spcPct val="100000"/>
-              </a:lnSpc>
-              <a:spcBef>
-                <a:spcPts val="300"/>
-              </a:spcBef>
-              <a:spcAft>
-                <a:spcPts val="300"/>
-              </a:spcAft>
-            </a:pPr>
-            <a:endParaRPr lang="en-US" dirty="0"/>
           </a:p>
         </p:txBody>
       </p:sp>
@@ -11562,7 +11535,7 @@
         </p:nvSpPr>
         <p:spPr>
           <a:xfrm>
-            <a:off x="5549451" y="5533037"/>
+            <a:off x="5530407" y="5665451"/>
             <a:ext cx="3990513" cy="400110"/>
           </a:xfrm>
           <a:prstGeom prst="rect">
@@ -11831,7 +11804,7 @@
         </p:nvSpPr>
         <p:spPr>
           <a:xfrm>
-            <a:off x="5549452" y="5837837"/>
+            <a:off x="5530408" y="6065561"/>
             <a:ext cx="3990513" cy="369332"/>
           </a:xfrm>
           <a:prstGeom prst="rect">
@@ -12092,10 +12065,550 @@
           </a:p>
         </p:txBody>
       </p:sp>
+      <p:sp>
+        <p:nvSpPr>
+          <p:cNvPr id="8" name="Text Placeholder 13"/>
+          <p:cNvSpPr>
+            <a:spLocks noGrp="1"/>
+          </p:cNvSpPr>
+          <p:nvPr/>
+        </p:nvSpPr>
+        <p:spPr>
+          <a:xfrm>
+            <a:off x="510540" y="6065561"/>
+            <a:ext cx="4574646" cy="369332"/>
+          </a:xfrm>
+          <a:prstGeom prst="rect">
+            <a:avLst/>
+          </a:prstGeom>
+          <a:noFill/>
+        </p:spPr>
+        <p:txBody>
+          <a:bodyPr wrap="square" rtlCol="0">
+            <a:spAutoFit/>
+          </a:bodyPr>
+          <a:lstStyle>
+            <a:lvl1pPr marL="319088" indent="-319088" algn="l" rtl="0" eaLnBrk="1" fontAlgn="base" hangingPunct="1">
+              <a:spcBef>
+                <a:spcPct val="20000"/>
+              </a:spcBef>
+              <a:spcAft>
+                <a:spcPct val="0"/>
+              </a:spcAft>
+              <a:buClr>
+                <a:schemeClr val="accent5">
+                  <a:lumMod val="40000"/>
+                  <a:lumOff val="60000"/>
+                </a:schemeClr>
+              </a:buClr>
+              <a:buSzPct val="70000"/>
+              <a:buFont typeface="Wingdings 2" pitchFamily="18" charset="2"/>
+              <a:buNone/>
+              <a:defRPr lang="en-US" sz="1800" b="1" kern="1200" dirty="0">
+                <a:solidFill>
+                  <a:schemeClr val="tx2">
+                    <a:lumMod val="20000"/>
+                    <a:lumOff val="80000"/>
+                  </a:schemeClr>
+                </a:solidFill>
+                <a:effectLst>
+                  <a:outerShdw blurRad="38100" dist="38100" dir="2700000" algn="tl">
+                    <a:srgbClr val="000000">
+                      <a:alpha val="43137"/>
+                    </a:srgbClr>
+                  </a:outerShdw>
+                </a:effectLst>
+                <a:latin typeface="Corbel" pitchFamily="34" charset="0"/>
+                <a:ea typeface="+mn-ea"/>
+                <a:cs typeface="+mn-cs"/>
+              </a:defRPr>
+            </a:lvl1pPr>
+            <a:lvl2pPr marL="630238" indent="-273050" algn="l" rtl="0" eaLnBrk="1" fontAlgn="base" hangingPunct="1">
+              <a:spcBef>
+                <a:spcPct val="20000"/>
+              </a:spcBef>
+              <a:spcAft>
+                <a:spcPct val="0"/>
+              </a:spcAft>
+              <a:buClr>
+                <a:schemeClr val="accent2">
+                  <a:lumMod val="60000"/>
+                  <a:lumOff val="40000"/>
+                </a:schemeClr>
+              </a:buClr>
+              <a:buFont typeface="Wingdings 2" pitchFamily="18" charset="2"/>
+              <a:buChar char=""/>
+              <a:defRPr sz="3000" b="1" kern="1200">
+                <a:solidFill>
+                  <a:schemeClr val="tx1">
+                    <a:lumMod val="20000"/>
+                    <a:lumOff val="80000"/>
+                  </a:schemeClr>
+                </a:solidFill>
+                <a:effectLst>
+                  <a:outerShdw blurRad="38100" dist="38100" dir="2700000" algn="tl">
+                    <a:srgbClr val="000000">
+                      <a:alpha val="43137"/>
+                    </a:srgbClr>
+                  </a:outerShdw>
+                </a:effectLst>
+                <a:latin typeface="+mn-lt"/>
+                <a:ea typeface="+mn-ea"/>
+                <a:cs typeface="+mn-cs"/>
+              </a:defRPr>
+            </a:lvl2pPr>
+            <a:lvl3pPr marL="922338" indent="-273050" algn="l" rtl="0" eaLnBrk="1" fontAlgn="base" hangingPunct="1">
+              <a:spcBef>
+                <a:spcPct val="20000"/>
+              </a:spcBef>
+              <a:spcAft>
+                <a:spcPct val="0"/>
+              </a:spcAft>
+              <a:buClr>
+                <a:schemeClr val="tx1">
+                  <a:lumMod val="50000"/>
+                </a:schemeClr>
+              </a:buClr>
+              <a:buFont typeface="Wingdings 2" pitchFamily="18" charset="2"/>
+              <a:buChar char=""/>
+              <a:defRPr sz="2800" b="1" kern="1200">
+                <a:solidFill>
+                  <a:schemeClr val="tx1">
+                    <a:lumMod val="20000"/>
+                    <a:lumOff val="80000"/>
+                  </a:schemeClr>
+                </a:solidFill>
+                <a:effectLst>
+                  <a:outerShdw blurRad="38100" dist="38100" dir="2700000" algn="tl">
+                    <a:srgbClr val="000000">
+                      <a:alpha val="43137"/>
+                    </a:srgbClr>
+                  </a:outerShdw>
+                </a:effectLst>
+                <a:latin typeface="+mn-lt"/>
+                <a:ea typeface="+mn-ea"/>
+                <a:cs typeface="+mn-cs"/>
+              </a:defRPr>
+            </a:lvl3pPr>
+            <a:lvl4pPr marL="1187450" indent="-228600" algn="l" rtl="0" eaLnBrk="1" fontAlgn="base" hangingPunct="1">
+              <a:spcBef>
+                <a:spcPct val="20000"/>
+              </a:spcBef>
+              <a:spcAft>
+                <a:spcPct val="0"/>
+              </a:spcAft>
+              <a:buClr>
+                <a:srgbClr val="F8BD52"/>
+              </a:buClr>
+              <a:buFont typeface="Wingdings 2" pitchFamily="18" charset="2"/>
+              <a:buChar char=""/>
+              <a:defRPr sz="2600" b="1" kern="1200">
+                <a:solidFill>
+                  <a:schemeClr val="tx1">
+                    <a:lumMod val="20000"/>
+                    <a:lumOff val="80000"/>
+                  </a:schemeClr>
+                </a:solidFill>
+                <a:effectLst>
+                  <a:outerShdw blurRad="38100" dist="38100" dir="2700000" algn="tl">
+                    <a:srgbClr val="000000">
+                      <a:alpha val="43137"/>
+                    </a:srgbClr>
+                  </a:outerShdw>
+                </a:effectLst>
+                <a:latin typeface="+mn-lt"/>
+                <a:ea typeface="+mn-ea"/>
+                <a:cs typeface="+mn-cs"/>
+              </a:defRPr>
+            </a:lvl4pPr>
+            <a:lvl5pPr marL="1425575" indent="-228600" algn="l" rtl="0" eaLnBrk="1" fontAlgn="base" hangingPunct="1">
+              <a:spcBef>
+                <a:spcPct val="20000"/>
+              </a:spcBef>
+              <a:spcAft>
+                <a:spcPct val="0"/>
+              </a:spcAft>
+              <a:buClr>
+                <a:srgbClr val="46A6BD"/>
+              </a:buClr>
+              <a:buFont typeface="Wingdings 2" pitchFamily="18" charset="2"/>
+              <a:buChar char=""/>
+              <a:defRPr sz="2400" b="1" kern="1200">
+                <a:solidFill>
+                  <a:schemeClr val="tx1">
+                    <a:lumMod val="20000"/>
+                    <a:lumOff val="80000"/>
+                  </a:schemeClr>
+                </a:solidFill>
+                <a:effectLst>
+                  <a:outerShdw blurRad="38100" dist="38100" dir="2700000" algn="tl">
+                    <a:srgbClr val="000000">
+                      <a:alpha val="43137"/>
+                    </a:srgbClr>
+                  </a:outerShdw>
+                </a:effectLst>
+                <a:latin typeface="+mn-lt"/>
+                <a:ea typeface="+mn-ea"/>
+                <a:cs typeface="+mn-cs"/>
+              </a:defRPr>
+            </a:lvl5pPr>
+            <a:lvl6pPr marL="1673352" indent="-228600" algn="l" rtl="0" eaLnBrk="1" latinLnBrk="0" hangingPunct="1">
+              <a:spcBef>
+                <a:spcPct val="20000"/>
+              </a:spcBef>
+              <a:buClr>
+                <a:schemeClr val="accent6"/>
+              </a:buClr>
+              <a:buFont typeface="Wingdings 2"/>
+              <a:buChar char=""/>
+              <a:defRPr sz="1800" kern="1200">
+                <a:solidFill>
+                  <a:schemeClr val="tx1"/>
+                </a:solidFill>
+                <a:latin typeface="+mn-lt"/>
+                <a:ea typeface="+mn-ea"/>
+                <a:cs typeface="+mn-cs"/>
+              </a:defRPr>
+            </a:lvl6pPr>
+            <a:lvl7pPr marL="1911096" indent="-228600" algn="l" rtl="0" eaLnBrk="1" latinLnBrk="0" hangingPunct="1">
+              <a:spcBef>
+                <a:spcPct val="20000"/>
+              </a:spcBef>
+              <a:buClr>
+                <a:schemeClr val="tx2"/>
+              </a:buClr>
+              <a:buFont typeface="Wingdings 2"/>
+              <a:buChar char=""/>
+              <a:defRPr sz="1600" kern="1200">
+                <a:solidFill>
+                  <a:schemeClr val="tx1"/>
+                </a:solidFill>
+                <a:latin typeface="+mn-lt"/>
+                <a:ea typeface="+mn-ea"/>
+                <a:cs typeface="+mn-cs"/>
+              </a:defRPr>
+            </a:lvl7pPr>
+            <a:lvl8pPr marL="2121408" indent="-182880" algn="l" rtl="0" eaLnBrk="1" latinLnBrk="0" hangingPunct="1">
+              <a:spcBef>
+                <a:spcPct val="20000"/>
+              </a:spcBef>
+              <a:buClr>
+                <a:schemeClr val="tx2"/>
+              </a:buClr>
+              <a:buFont typeface="Wingdings 2"/>
+              <a:buChar char=""/>
+              <a:defRPr sz="1400" kern="1200">
+                <a:solidFill>
+                  <a:schemeClr val="tx1"/>
+                </a:solidFill>
+                <a:latin typeface="+mn-lt"/>
+                <a:ea typeface="+mn-ea"/>
+                <a:cs typeface="+mn-cs"/>
+              </a:defRPr>
+            </a:lvl8pPr>
+            <a:lvl9pPr marL="2322576" indent="-182880" algn="l" rtl="0" eaLnBrk="1" latinLnBrk="0" hangingPunct="1">
+              <a:spcBef>
+                <a:spcPct val="20000"/>
+              </a:spcBef>
+              <a:buClr>
+                <a:schemeClr val="tx2"/>
+              </a:buClr>
+              <a:buFont typeface="Wingdings 2"/>
+              <a:buChar char=""/>
+              <a:defRPr sz="1400" kern="1200">
+                <a:solidFill>
+                  <a:schemeClr val="tx1"/>
+                </a:solidFill>
+                <a:latin typeface="+mn-lt"/>
+                <a:ea typeface="+mn-ea"/>
+                <a:cs typeface="+mn-cs"/>
+              </a:defRPr>
+            </a:lvl9pPr>
+          </a:lstStyle>
+          <a:p>
+            <a:r>
+              <a:rPr lang="en-US" dirty="0">
+                <a:hlinkClick r:id="rId4"/>
+              </a:rPr>
+              <a:t>https://github.com/dtopuzov/qa-academy</a:t>
+            </a:r>
+            <a:endParaRPr lang="en-US" dirty="0"/>
+          </a:p>
+        </p:txBody>
+      </p:sp>
+      <p:sp>
+        <p:nvSpPr>
+          <p:cNvPr id="12" name="Text Placeholder 12"/>
+          <p:cNvSpPr>
+            <a:spLocks noGrp="1"/>
+          </p:cNvSpPr>
+          <p:nvPr/>
+        </p:nvSpPr>
+        <p:spPr>
+          <a:xfrm>
+            <a:off x="510540" y="5647520"/>
+            <a:ext cx="3990513" cy="400110"/>
+          </a:xfrm>
+          <a:prstGeom prst="rect">
+            <a:avLst/>
+          </a:prstGeom>
+          <a:noFill/>
+        </p:spPr>
+        <p:txBody>
+          <a:bodyPr wrap="square" rtlCol="0">
+            <a:spAutoFit/>
+          </a:bodyPr>
+          <a:lstStyle>
+            <a:lvl1pPr marL="319088" indent="-319088" algn="l" rtl="0" eaLnBrk="1" fontAlgn="base" hangingPunct="1">
+              <a:spcBef>
+                <a:spcPct val="20000"/>
+              </a:spcBef>
+              <a:spcAft>
+                <a:spcPct val="0"/>
+              </a:spcAft>
+              <a:buClr>
+                <a:schemeClr val="accent5">
+                  <a:lumMod val="40000"/>
+                  <a:lumOff val="60000"/>
+                </a:schemeClr>
+              </a:buClr>
+              <a:buSzPct val="70000"/>
+              <a:buFont typeface="Wingdings 2" pitchFamily="18" charset="2"/>
+              <a:buNone/>
+              <a:defRPr lang="en-US" sz="2000" b="1" kern="1200" dirty="0">
+                <a:solidFill>
+                  <a:schemeClr val="tx2">
+                    <a:lumMod val="20000"/>
+                    <a:lumOff val="80000"/>
+                  </a:schemeClr>
+                </a:solidFill>
+                <a:effectLst>
+                  <a:outerShdw blurRad="38100" dist="38100" dir="2700000" algn="tl">
+                    <a:srgbClr val="000000">
+                      <a:alpha val="43137"/>
+                    </a:srgbClr>
+                  </a:outerShdw>
+                </a:effectLst>
+                <a:latin typeface="Corbel" pitchFamily="34" charset="0"/>
+                <a:ea typeface="+mn-ea"/>
+                <a:cs typeface="+mn-cs"/>
+              </a:defRPr>
+            </a:lvl1pPr>
+            <a:lvl2pPr marL="630238" indent="-273050" algn="l" rtl="0" eaLnBrk="1" fontAlgn="base" hangingPunct="1">
+              <a:spcBef>
+                <a:spcPct val="20000"/>
+              </a:spcBef>
+              <a:spcAft>
+                <a:spcPct val="0"/>
+              </a:spcAft>
+              <a:buClr>
+                <a:schemeClr val="accent2">
+                  <a:lumMod val="60000"/>
+                  <a:lumOff val="40000"/>
+                </a:schemeClr>
+              </a:buClr>
+              <a:buFont typeface="Wingdings 2" pitchFamily="18" charset="2"/>
+              <a:buChar char=""/>
+              <a:defRPr sz="3000" b="1" kern="1200">
+                <a:solidFill>
+                  <a:schemeClr val="tx1">
+                    <a:lumMod val="20000"/>
+                    <a:lumOff val="80000"/>
+                  </a:schemeClr>
+                </a:solidFill>
+                <a:effectLst>
+                  <a:outerShdw blurRad="38100" dist="38100" dir="2700000" algn="tl">
+                    <a:srgbClr val="000000">
+                      <a:alpha val="43137"/>
+                    </a:srgbClr>
+                  </a:outerShdw>
+                </a:effectLst>
+                <a:latin typeface="+mn-lt"/>
+                <a:ea typeface="+mn-ea"/>
+                <a:cs typeface="+mn-cs"/>
+              </a:defRPr>
+            </a:lvl2pPr>
+            <a:lvl3pPr marL="922338" indent="-273050" algn="l" rtl="0" eaLnBrk="1" fontAlgn="base" hangingPunct="1">
+              <a:spcBef>
+                <a:spcPct val="20000"/>
+              </a:spcBef>
+              <a:spcAft>
+                <a:spcPct val="0"/>
+              </a:spcAft>
+              <a:buClr>
+                <a:schemeClr val="tx1">
+                  <a:lumMod val="50000"/>
+                </a:schemeClr>
+              </a:buClr>
+              <a:buFont typeface="Wingdings 2" pitchFamily="18" charset="2"/>
+              <a:buChar char=""/>
+              <a:defRPr sz="2800" b="1" kern="1200">
+                <a:solidFill>
+                  <a:schemeClr val="tx1">
+                    <a:lumMod val="20000"/>
+                    <a:lumOff val="80000"/>
+                  </a:schemeClr>
+                </a:solidFill>
+                <a:effectLst>
+                  <a:outerShdw blurRad="38100" dist="38100" dir="2700000" algn="tl">
+                    <a:srgbClr val="000000">
+                      <a:alpha val="43137"/>
+                    </a:srgbClr>
+                  </a:outerShdw>
+                </a:effectLst>
+                <a:latin typeface="+mn-lt"/>
+                <a:ea typeface="+mn-ea"/>
+                <a:cs typeface="+mn-cs"/>
+              </a:defRPr>
+            </a:lvl3pPr>
+            <a:lvl4pPr marL="1187450" indent="-228600" algn="l" rtl="0" eaLnBrk="1" fontAlgn="base" hangingPunct="1">
+              <a:spcBef>
+                <a:spcPct val="20000"/>
+              </a:spcBef>
+              <a:spcAft>
+                <a:spcPct val="0"/>
+              </a:spcAft>
+              <a:buClr>
+                <a:srgbClr val="F8BD52"/>
+              </a:buClr>
+              <a:buFont typeface="Wingdings 2" pitchFamily="18" charset="2"/>
+              <a:buChar char=""/>
+              <a:defRPr sz="2600" b="1" kern="1200">
+                <a:solidFill>
+                  <a:schemeClr val="tx1">
+                    <a:lumMod val="20000"/>
+                    <a:lumOff val="80000"/>
+                  </a:schemeClr>
+                </a:solidFill>
+                <a:effectLst>
+                  <a:outerShdw blurRad="38100" dist="38100" dir="2700000" algn="tl">
+                    <a:srgbClr val="000000">
+                      <a:alpha val="43137"/>
+                    </a:srgbClr>
+                  </a:outerShdw>
+                </a:effectLst>
+                <a:latin typeface="+mn-lt"/>
+                <a:ea typeface="+mn-ea"/>
+                <a:cs typeface="+mn-cs"/>
+              </a:defRPr>
+            </a:lvl4pPr>
+            <a:lvl5pPr marL="1425575" indent="-228600" algn="l" rtl="0" eaLnBrk="1" fontAlgn="base" hangingPunct="1">
+              <a:spcBef>
+                <a:spcPct val="20000"/>
+              </a:spcBef>
+              <a:spcAft>
+                <a:spcPct val="0"/>
+              </a:spcAft>
+              <a:buClr>
+                <a:srgbClr val="46A6BD"/>
+              </a:buClr>
+              <a:buFont typeface="Wingdings 2" pitchFamily="18" charset="2"/>
+              <a:buChar char=""/>
+              <a:defRPr sz="2400" b="1" kern="1200">
+                <a:solidFill>
+                  <a:schemeClr val="tx1">
+                    <a:lumMod val="20000"/>
+                    <a:lumOff val="80000"/>
+                  </a:schemeClr>
+                </a:solidFill>
+                <a:effectLst>
+                  <a:outerShdw blurRad="38100" dist="38100" dir="2700000" algn="tl">
+                    <a:srgbClr val="000000">
+                      <a:alpha val="43137"/>
+                    </a:srgbClr>
+                  </a:outerShdw>
+                </a:effectLst>
+                <a:latin typeface="+mn-lt"/>
+                <a:ea typeface="+mn-ea"/>
+                <a:cs typeface="+mn-cs"/>
+              </a:defRPr>
+            </a:lvl5pPr>
+            <a:lvl6pPr marL="1673352" indent="-228600" algn="l" rtl="0" eaLnBrk="1" latinLnBrk="0" hangingPunct="1">
+              <a:spcBef>
+                <a:spcPct val="20000"/>
+              </a:spcBef>
+              <a:buClr>
+                <a:schemeClr val="accent6"/>
+              </a:buClr>
+              <a:buFont typeface="Wingdings 2"/>
+              <a:buChar char=""/>
+              <a:defRPr sz="1800" kern="1200">
+                <a:solidFill>
+                  <a:schemeClr val="tx1"/>
+                </a:solidFill>
+                <a:latin typeface="+mn-lt"/>
+                <a:ea typeface="+mn-ea"/>
+                <a:cs typeface="+mn-cs"/>
+              </a:defRPr>
+            </a:lvl6pPr>
+            <a:lvl7pPr marL="1911096" indent="-228600" algn="l" rtl="0" eaLnBrk="1" latinLnBrk="0" hangingPunct="1">
+              <a:spcBef>
+                <a:spcPct val="20000"/>
+              </a:spcBef>
+              <a:buClr>
+                <a:schemeClr val="tx2"/>
+              </a:buClr>
+              <a:buFont typeface="Wingdings 2"/>
+              <a:buChar char=""/>
+              <a:defRPr sz="1600" kern="1200">
+                <a:solidFill>
+                  <a:schemeClr val="tx1"/>
+                </a:solidFill>
+                <a:latin typeface="+mn-lt"/>
+                <a:ea typeface="+mn-ea"/>
+                <a:cs typeface="+mn-cs"/>
+              </a:defRPr>
+            </a:lvl7pPr>
+            <a:lvl8pPr marL="2121408" indent="-182880" algn="l" rtl="0" eaLnBrk="1" latinLnBrk="0" hangingPunct="1">
+              <a:spcBef>
+                <a:spcPct val="20000"/>
+              </a:spcBef>
+              <a:buClr>
+                <a:schemeClr val="tx2"/>
+              </a:buClr>
+              <a:buFont typeface="Wingdings 2"/>
+              <a:buChar char=""/>
+              <a:defRPr sz="1400" kern="1200">
+                <a:solidFill>
+                  <a:schemeClr val="tx1"/>
+                </a:solidFill>
+                <a:latin typeface="+mn-lt"/>
+                <a:ea typeface="+mn-ea"/>
+                <a:cs typeface="+mn-cs"/>
+              </a:defRPr>
+            </a:lvl8pPr>
+            <a:lvl9pPr marL="2322576" indent="-182880" algn="l" rtl="0" eaLnBrk="1" latinLnBrk="0" hangingPunct="1">
+              <a:spcBef>
+                <a:spcPct val="20000"/>
+              </a:spcBef>
+              <a:buClr>
+                <a:schemeClr val="tx2"/>
+              </a:buClr>
+              <a:buFont typeface="Wingdings 2"/>
+              <a:buChar char=""/>
+              <a:defRPr sz="1400" kern="1200">
+                <a:solidFill>
+                  <a:schemeClr val="tx1"/>
+                </a:solidFill>
+                <a:latin typeface="+mn-lt"/>
+                <a:ea typeface="+mn-ea"/>
+                <a:cs typeface="+mn-cs"/>
+              </a:defRPr>
+            </a:lvl9pPr>
+          </a:lstStyle>
+          <a:p>
+            <a:r>
+              <a:rPr lang="en-US" dirty="0" smtClean="0"/>
+              <a:t>Resources:</a:t>
+            </a:r>
+            <a:endParaRPr lang="en-US" dirty="0"/>
+          </a:p>
+        </p:txBody>
+      </p:sp>
     </p:spTree>
     <p:extLst>
       <p:ext uri="{BB962C8B-B14F-4D97-AF65-F5344CB8AC3E}">
-        <p14:creationId xmlns:p14="http://schemas.microsoft.com/office/powerpoint/2010/main" val="1093054388"/>
+        <p14:creationId xmlns:p14="http://schemas.microsoft.com/office/powerpoint/2010/main" val="2800679100"/>
       </p:ext>
     </p:extLst>
   </p:cSld>

</xml_diff>

<commit_message>
Update TTF and Specflow slides.
</commit_message>
<xml_diff>
--- a/Slides/Specflow/Specflow.pptx
+++ b/Slides/Specflow/Specflow.pptx
@@ -225,7 +225,7 @@
           <a:p>
             <a:fld id="{644303E9-1A8A-406D-9DFA-FF87524EDF5C}" type="datetimeFigureOut">
               <a:rPr lang="en-US" smtClean="0"/>
-              <a:t>10/5/2014</a:t>
+              <a:t>10/6/2014</a:t>
             </a:fld>
             <a:endParaRPr lang="en-US"/>
           </a:p>
@@ -8755,7 +8755,7 @@
           <a:bodyPr/>
           <a:lstStyle/>
           <a:p>
-            <a:pPr lvl="1">
+            <a:pPr>
               <a:lnSpc>
                 <a:spcPct val="100000"/>
               </a:lnSpc>
@@ -8766,7 +8766,7 @@
             </a:r>
           </a:p>
           <a:p>
-            <a:pPr lvl="1">
+            <a:pPr>
               <a:lnSpc>
                 <a:spcPct val="100000"/>
               </a:lnSpc>
@@ -8781,7 +8781,7 @@
             </a:r>
           </a:p>
           <a:p>
-            <a:pPr lvl="1">
+            <a:pPr>
               <a:lnSpc>
                 <a:spcPct val="100000"/>
               </a:lnSpc>
@@ -8800,7 +8800,7 @@
             </a:r>
           </a:p>
           <a:p>
-            <a:pPr lvl="1">
+            <a:pPr>
               <a:lnSpc>
                 <a:spcPct val="100000"/>
               </a:lnSpc>
@@ -8819,7 +8819,7 @@
             </a:r>
           </a:p>
           <a:p>
-            <a:pPr lvl="2">
+            <a:pPr lvl="1">
               <a:lnSpc>
                 <a:spcPct val="100000"/>
               </a:lnSpc>

</xml_diff>